<commit_message>
Master Slide is created.
</commit_message>
<xml_diff>
--- a/OpenSTAAD/Master Slide.pptx
+++ b/OpenSTAAD/Master Slide.pptx
@@ -155,14 +155,22 @@
             <p:ph type="dt" sz="half" idx="10"/>
           </p:nvPr>
         </p:nvSpPr>
-        <p:spPr/>
+        <p:spPr>
+          <a:xfrm>
+            <a:off x="838200" y="6356350"/>
+            <a:ext cx="2743200" cy="365125"/>
+          </a:xfrm>
+          <a:prstGeom prst="rect">
+            <a:avLst/>
+          </a:prstGeom>
+        </p:spPr>
         <p:txBody>
           <a:bodyPr/>
           <a:lstStyle/>
           <a:p>
             <a:fld id="{BF754244-AAAE-40DB-B4EC-80B888C903F9}" type="datetimeFigureOut">
               <a:rPr lang="en-IN" smtClean="0"/>
-              <a:t>30-12-2022</a:t>
+              <a:t>01-01-2023</a:t>
             </a:fld>
             <a:endParaRPr lang="en-IN"/>
           </a:p>
@@ -184,7 +192,15 @@
             <p:ph type="ftr" sz="quarter" idx="11"/>
           </p:nvPr>
         </p:nvSpPr>
-        <p:spPr/>
+        <p:spPr>
+          <a:xfrm>
+            <a:off x="4038600" y="6356350"/>
+            <a:ext cx="4114800" cy="365125"/>
+          </a:xfrm>
+          <a:prstGeom prst="rect">
+            <a:avLst/>
+          </a:prstGeom>
+        </p:spPr>
         <p:txBody>
           <a:bodyPr/>
           <a:lstStyle/>
@@ -209,7 +225,15 @@
             <p:ph type="sldNum" sz="quarter" idx="12"/>
           </p:nvPr>
         </p:nvSpPr>
-        <p:spPr/>
+        <p:spPr>
+          <a:xfrm>
+            <a:off x="8610600" y="6356350"/>
+            <a:ext cx="2743200" cy="365125"/>
+          </a:xfrm>
+          <a:prstGeom prst="rect">
+            <a:avLst/>
+          </a:prstGeom>
+        </p:spPr>
         <p:txBody>
           <a:bodyPr/>
           <a:lstStyle/>
@@ -268,7 +292,15 @@
             <p:ph type="title"/>
           </p:nvPr>
         </p:nvSpPr>
-        <p:spPr/>
+        <p:spPr>
+          <a:xfrm>
+            <a:off x="838200" y="365125"/>
+            <a:ext cx="10515600" cy="1325563"/>
+          </a:xfrm>
+          <a:prstGeom prst="rect">
+            <a:avLst/>
+          </a:prstGeom>
+        </p:spPr>
         <p:txBody>
           <a:bodyPr/>
           <a:lstStyle/>
@@ -297,7 +329,15 @@
             <p:ph type="body" orient="vert" idx="1"/>
           </p:nvPr>
         </p:nvSpPr>
-        <p:spPr/>
+        <p:spPr>
+          <a:xfrm>
+            <a:off x="838200" y="1825625"/>
+            <a:ext cx="10515600" cy="4351338"/>
+          </a:xfrm>
+          <a:prstGeom prst="rect">
+            <a:avLst/>
+          </a:prstGeom>
+        </p:spPr>
         <p:txBody>
           <a:bodyPr vert="eaVert"/>
           <a:lstStyle/>
@@ -355,14 +395,22 @@
             <p:ph type="dt" sz="half" idx="10"/>
           </p:nvPr>
         </p:nvSpPr>
-        <p:spPr/>
+        <p:spPr>
+          <a:xfrm>
+            <a:off x="838200" y="6356350"/>
+            <a:ext cx="2743200" cy="365125"/>
+          </a:xfrm>
+          <a:prstGeom prst="rect">
+            <a:avLst/>
+          </a:prstGeom>
+        </p:spPr>
         <p:txBody>
           <a:bodyPr/>
           <a:lstStyle/>
           <a:p>
             <a:fld id="{BF754244-AAAE-40DB-B4EC-80B888C903F9}" type="datetimeFigureOut">
               <a:rPr lang="en-IN" smtClean="0"/>
-              <a:t>30-12-2022</a:t>
+              <a:t>01-01-2023</a:t>
             </a:fld>
             <a:endParaRPr lang="en-IN"/>
           </a:p>
@@ -384,7 +432,15 @@
             <p:ph type="ftr" sz="quarter" idx="11"/>
           </p:nvPr>
         </p:nvSpPr>
-        <p:spPr/>
+        <p:spPr>
+          <a:xfrm>
+            <a:off x="4038600" y="6356350"/>
+            <a:ext cx="4114800" cy="365125"/>
+          </a:xfrm>
+          <a:prstGeom prst="rect">
+            <a:avLst/>
+          </a:prstGeom>
+        </p:spPr>
         <p:txBody>
           <a:bodyPr/>
           <a:lstStyle/>
@@ -409,7 +465,15 @@
             <p:ph type="sldNum" sz="quarter" idx="12"/>
           </p:nvPr>
         </p:nvSpPr>
-        <p:spPr/>
+        <p:spPr>
+          <a:xfrm>
+            <a:off x="8610600" y="6356350"/>
+            <a:ext cx="2743200" cy="365125"/>
+          </a:xfrm>
+          <a:prstGeom prst="rect">
+            <a:avLst/>
+          </a:prstGeom>
+        </p:spPr>
         <p:txBody>
           <a:bodyPr/>
           <a:lstStyle/>
@@ -473,6 +537,9 @@
             <a:off x="8724900" y="365125"/>
             <a:ext cx="2628900" cy="5811838"/>
           </a:xfrm>
+          <a:prstGeom prst="rect">
+            <a:avLst/>
+          </a:prstGeom>
         </p:spPr>
         <p:txBody>
           <a:bodyPr vert="eaVert"/>
@@ -507,6 +574,9 @@
             <a:off x="838200" y="365125"/>
             <a:ext cx="7734300" cy="5811838"/>
           </a:xfrm>
+          <a:prstGeom prst="rect">
+            <a:avLst/>
+          </a:prstGeom>
         </p:spPr>
         <p:txBody>
           <a:bodyPr vert="eaVert"/>
@@ -565,14 +635,22 @@
             <p:ph type="dt" sz="half" idx="10"/>
           </p:nvPr>
         </p:nvSpPr>
-        <p:spPr/>
+        <p:spPr>
+          <a:xfrm>
+            <a:off x="838200" y="6356350"/>
+            <a:ext cx="2743200" cy="365125"/>
+          </a:xfrm>
+          <a:prstGeom prst="rect">
+            <a:avLst/>
+          </a:prstGeom>
+        </p:spPr>
         <p:txBody>
           <a:bodyPr/>
           <a:lstStyle/>
           <a:p>
             <a:fld id="{BF754244-AAAE-40DB-B4EC-80B888C903F9}" type="datetimeFigureOut">
               <a:rPr lang="en-IN" smtClean="0"/>
-              <a:t>30-12-2022</a:t>
+              <a:t>01-01-2023</a:t>
             </a:fld>
             <a:endParaRPr lang="en-IN"/>
           </a:p>
@@ -594,7 +672,15 @@
             <p:ph type="ftr" sz="quarter" idx="11"/>
           </p:nvPr>
         </p:nvSpPr>
-        <p:spPr/>
+        <p:spPr>
+          <a:xfrm>
+            <a:off x="4038600" y="6356350"/>
+            <a:ext cx="4114800" cy="365125"/>
+          </a:xfrm>
+          <a:prstGeom prst="rect">
+            <a:avLst/>
+          </a:prstGeom>
+        </p:spPr>
         <p:txBody>
           <a:bodyPr/>
           <a:lstStyle/>
@@ -619,7 +705,15 @@
             <p:ph type="sldNum" sz="quarter" idx="12"/>
           </p:nvPr>
         </p:nvSpPr>
-        <p:spPr/>
+        <p:spPr>
+          <a:xfrm>
+            <a:off x="8610600" y="6356350"/>
+            <a:ext cx="2743200" cy="365125"/>
+          </a:xfrm>
+          <a:prstGeom prst="rect">
+            <a:avLst/>
+          </a:prstGeom>
+        </p:spPr>
         <p:txBody>
           <a:bodyPr/>
           <a:lstStyle/>
@@ -678,7 +772,15 @@
             <p:ph type="title"/>
           </p:nvPr>
         </p:nvSpPr>
-        <p:spPr/>
+        <p:spPr>
+          <a:xfrm>
+            <a:off x="838200" y="365125"/>
+            <a:ext cx="10515600" cy="1325563"/>
+          </a:xfrm>
+          <a:prstGeom prst="rect">
+            <a:avLst/>
+          </a:prstGeom>
+        </p:spPr>
         <p:txBody>
           <a:bodyPr/>
           <a:lstStyle/>
@@ -707,7 +809,15 @@
             <p:ph idx="1"/>
           </p:nvPr>
         </p:nvSpPr>
-        <p:spPr/>
+        <p:spPr>
+          <a:xfrm>
+            <a:off x="838200" y="1825625"/>
+            <a:ext cx="10515600" cy="4351338"/>
+          </a:xfrm>
+          <a:prstGeom prst="rect">
+            <a:avLst/>
+          </a:prstGeom>
+        </p:spPr>
         <p:txBody>
           <a:bodyPr/>
           <a:lstStyle/>
@@ -765,14 +875,22 @@
             <p:ph type="dt" sz="half" idx="10"/>
           </p:nvPr>
         </p:nvSpPr>
-        <p:spPr/>
+        <p:spPr>
+          <a:xfrm>
+            <a:off x="838200" y="6356350"/>
+            <a:ext cx="2743200" cy="365125"/>
+          </a:xfrm>
+          <a:prstGeom prst="rect">
+            <a:avLst/>
+          </a:prstGeom>
+        </p:spPr>
         <p:txBody>
           <a:bodyPr/>
           <a:lstStyle/>
           <a:p>
             <a:fld id="{BF754244-AAAE-40DB-B4EC-80B888C903F9}" type="datetimeFigureOut">
               <a:rPr lang="en-IN" smtClean="0"/>
-              <a:t>30-12-2022</a:t>
+              <a:t>01-01-2023</a:t>
             </a:fld>
             <a:endParaRPr lang="en-IN"/>
           </a:p>
@@ -794,7 +912,15 @@
             <p:ph type="ftr" sz="quarter" idx="11"/>
           </p:nvPr>
         </p:nvSpPr>
-        <p:spPr/>
+        <p:spPr>
+          <a:xfrm>
+            <a:off x="4038600" y="6356350"/>
+            <a:ext cx="4114800" cy="365125"/>
+          </a:xfrm>
+          <a:prstGeom prst="rect">
+            <a:avLst/>
+          </a:prstGeom>
+        </p:spPr>
         <p:txBody>
           <a:bodyPr/>
           <a:lstStyle/>
@@ -819,7 +945,15 @@
             <p:ph type="sldNum" sz="quarter" idx="12"/>
           </p:nvPr>
         </p:nvSpPr>
-        <p:spPr/>
+        <p:spPr>
+          <a:xfrm>
+            <a:off x="8610600" y="6356350"/>
+            <a:ext cx="2743200" cy="365125"/>
+          </a:xfrm>
+          <a:prstGeom prst="rect">
+            <a:avLst/>
+          </a:prstGeom>
+        </p:spPr>
         <p:txBody>
           <a:bodyPr/>
           <a:lstStyle/>
@@ -883,6 +1017,9 @@
             <a:off x="831850" y="1709738"/>
             <a:ext cx="10515600" cy="2852737"/>
           </a:xfrm>
+          <a:prstGeom prst="rect">
+            <a:avLst/>
+          </a:prstGeom>
         </p:spPr>
         <p:txBody>
           <a:bodyPr anchor="b"/>
@@ -921,6 +1058,9 @@
             <a:off x="831850" y="4589463"/>
             <a:ext cx="10515600" cy="1500187"/>
           </a:xfrm>
+          <a:prstGeom prst="rect">
+            <a:avLst/>
+          </a:prstGeom>
         </p:spPr>
         <p:txBody>
           <a:bodyPr/>
@@ -1041,14 +1181,22 @@
             <p:ph type="dt" sz="half" idx="10"/>
           </p:nvPr>
         </p:nvSpPr>
-        <p:spPr/>
+        <p:spPr>
+          <a:xfrm>
+            <a:off x="838200" y="6356350"/>
+            <a:ext cx="2743200" cy="365125"/>
+          </a:xfrm>
+          <a:prstGeom prst="rect">
+            <a:avLst/>
+          </a:prstGeom>
+        </p:spPr>
         <p:txBody>
           <a:bodyPr/>
           <a:lstStyle/>
           <a:p>
             <a:fld id="{BF754244-AAAE-40DB-B4EC-80B888C903F9}" type="datetimeFigureOut">
               <a:rPr lang="en-IN" smtClean="0"/>
-              <a:t>30-12-2022</a:t>
+              <a:t>01-01-2023</a:t>
             </a:fld>
             <a:endParaRPr lang="en-IN"/>
           </a:p>
@@ -1070,7 +1218,15 @@
             <p:ph type="ftr" sz="quarter" idx="11"/>
           </p:nvPr>
         </p:nvSpPr>
-        <p:spPr/>
+        <p:spPr>
+          <a:xfrm>
+            <a:off x="4038600" y="6356350"/>
+            <a:ext cx="4114800" cy="365125"/>
+          </a:xfrm>
+          <a:prstGeom prst="rect">
+            <a:avLst/>
+          </a:prstGeom>
+        </p:spPr>
         <p:txBody>
           <a:bodyPr/>
           <a:lstStyle/>
@@ -1095,7 +1251,15 @@
             <p:ph type="sldNum" sz="quarter" idx="12"/>
           </p:nvPr>
         </p:nvSpPr>
-        <p:spPr/>
+        <p:spPr>
+          <a:xfrm>
+            <a:off x="8610600" y="6356350"/>
+            <a:ext cx="2743200" cy="365125"/>
+          </a:xfrm>
+          <a:prstGeom prst="rect">
+            <a:avLst/>
+          </a:prstGeom>
+        </p:spPr>
         <p:txBody>
           <a:bodyPr/>
           <a:lstStyle/>
@@ -1154,7 +1318,15 @@
             <p:ph type="title"/>
           </p:nvPr>
         </p:nvSpPr>
-        <p:spPr/>
+        <p:spPr>
+          <a:xfrm>
+            <a:off x="838200" y="365125"/>
+            <a:ext cx="10515600" cy="1325563"/>
+          </a:xfrm>
+          <a:prstGeom prst="rect">
+            <a:avLst/>
+          </a:prstGeom>
+        </p:spPr>
         <p:txBody>
           <a:bodyPr/>
           <a:lstStyle/>
@@ -1188,6 +1360,9 @@
             <a:off x="838200" y="1825625"/>
             <a:ext cx="5181600" cy="4351338"/>
           </a:xfrm>
+          <a:prstGeom prst="rect">
+            <a:avLst/>
+          </a:prstGeom>
         </p:spPr>
         <p:txBody>
           <a:bodyPr/>
@@ -1251,6 +1426,9 @@
             <a:off x="6172200" y="1825625"/>
             <a:ext cx="5181600" cy="4351338"/>
           </a:xfrm>
+          <a:prstGeom prst="rect">
+            <a:avLst/>
+          </a:prstGeom>
         </p:spPr>
         <p:txBody>
           <a:bodyPr/>
@@ -1309,14 +1487,22 @@
             <p:ph type="dt" sz="half" idx="10"/>
           </p:nvPr>
         </p:nvSpPr>
-        <p:spPr/>
+        <p:spPr>
+          <a:xfrm>
+            <a:off x="838200" y="6356350"/>
+            <a:ext cx="2743200" cy="365125"/>
+          </a:xfrm>
+          <a:prstGeom prst="rect">
+            <a:avLst/>
+          </a:prstGeom>
+        </p:spPr>
         <p:txBody>
           <a:bodyPr/>
           <a:lstStyle/>
           <a:p>
             <a:fld id="{BF754244-AAAE-40DB-B4EC-80B888C903F9}" type="datetimeFigureOut">
               <a:rPr lang="en-IN" smtClean="0"/>
-              <a:t>30-12-2022</a:t>
+              <a:t>01-01-2023</a:t>
             </a:fld>
             <a:endParaRPr lang="en-IN"/>
           </a:p>
@@ -1338,7 +1524,15 @@
             <p:ph type="ftr" sz="quarter" idx="11"/>
           </p:nvPr>
         </p:nvSpPr>
-        <p:spPr/>
+        <p:spPr>
+          <a:xfrm>
+            <a:off x="4038600" y="6356350"/>
+            <a:ext cx="4114800" cy="365125"/>
+          </a:xfrm>
+          <a:prstGeom prst="rect">
+            <a:avLst/>
+          </a:prstGeom>
+        </p:spPr>
         <p:txBody>
           <a:bodyPr/>
           <a:lstStyle/>
@@ -1363,7 +1557,15 @@
             <p:ph type="sldNum" sz="quarter" idx="12"/>
           </p:nvPr>
         </p:nvSpPr>
-        <p:spPr/>
+        <p:spPr>
+          <a:xfrm>
+            <a:off x="8610600" y="6356350"/>
+            <a:ext cx="2743200" cy="365125"/>
+          </a:xfrm>
+          <a:prstGeom prst="rect">
+            <a:avLst/>
+          </a:prstGeom>
+        </p:spPr>
         <p:txBody>
           <a:bodyPr/>
           <a:lstStyle/>
@@ -1427,6 +1629,9 @@
             <a:off x="839788" y="365125"/>
             <a:ext cx="10515600" cy="1325563"/>
           </a:xfrm>
+          <a:prstGeom prst="rect">
+            <a:avLst/>
+          </a:prstGeom>
         </p:spPr>
         <p:txBody>
           <a:bodyPr/>
@@ -1461,6 +1666,9 @@
             <a:off x="839788" y="1681163"/>
             <a:ext cx="5157787" cy="823912"/>
           </a:xfrm>
+          <a:prstGeom prst="rect">
+            <a:avLst/>
+          </a:prstGeom>
         </p:spPr>
         <p:txBody>
           <a:bodyPr anchor="b"/>
@@ -1532,6 +1740,9 @@
             <a:off x="839788" y="2505075"/>
             <a:ext cx="5157787" cy="3684588"/>
           </a:xfrm>
+          <a:prstGeom prst="rect">
+            <a:avLst/>
+          </a:prstGeom>
         </p:spPr>
         <p:txBody>
           <a:bodyPr/>
@@ -1595,6 +1806,9 @@
             <a:off x="6172200" y="1681163"/>
             <a:ext cx="5183188" cy="823912"/>
           </a:xfrm>
+          <a:prstGeom prst="rect">
+            <a:avLst/>
+          </a:prstGeom>
         </p:spPr>
         <p:txBody>
           <a:bodyPr anchor="b"/>
@@ -1666,6 +1880,9 @@
             <a:off x="6172200" y="2505075"/>
             <a:ext cx="5183188" cy="3684588"/>
           </a:xfrm>
+          <a:prstGeom prst="rect">
+            <a:avLst/>
+          </a:prstGeom>
         </p:spPr>
         <p:txBody>
           <a:bodyPr/>
@@ -1724,14 +1941,22 @@
             <p:ph type="dt" sz="half" idx="10"/>
           </p:nvPr>
         </p:nvSpPr>
-        <p:spPr/>
+        <p:spPr>
+          <a:xfrm>
+            <a:off x="838200" y="6356350"/>
+            <a:ext cx="2743200" cy="365125"/>
+          </a:xfrm>
+          <a:prstGeom prst="rect">
+            <a:avLst/>
+          </a:prstGeom>
+        </p:spPr>
         <p:txBody>
           <a:bodyPr/>
           <a:lstStyle/>
           <a:p>
             <a:fld id="{BF754244-AAAE-40DB-B4EC-80B888C903F9}" type="datetimeFigureOut">
               <a:rPr lang="en-IN" smtClean="0"/>
-              <a:t>30-12-2022</a:t>
+              <a:t>01-01-2023</a:t>
             </a:fld>
             <a:endParaRPr lang="en-IN"/>
           </a:p>
@@ -1753,7 +1978,15 @@
             <p:ph type="ftr" sz="quarter" idx="11"/>
           </p:nvPr>
         </p:nvSpPr>
-        <p:spPr/>
+        <p:spPr>
+          <a:xfrm>
+            <a:off x="4038600" y="6356350"/>
+            <a:ext cx="4114800" cy="365125"/>
+          </a:xfrm>
+          <a:prstGeom prst="rect">
+            <a:avLst/>
+          </a:prstGeom>
+        </p:spPr>
         <p:txBody>
           <a:bodyPr/>
           <a:lstStyle/>
@@ -1778,7 +2011,15 @@
             <p:ph type="sldNum" sz="quarter" idx="12"/>
           </p:nvPr>
         </p:nvSpPr>
-        <p:spPr/>
+        <p:spPr>
+          <a:xfrm>
+            <a:off x="8610600" y="6356350"/>
+            <a:ext cx="2743200" cy="365125"/>
+          </a:xfrm>
+          <a:prstGeom prst="rect">
+            <a:avLst/>
+          </a:prstGeom>
+        </p:spPr>
         <p:txBody>
           <a:bodyPr/>
           <a:lstStyle/>
@@ -1837,7 +2078,15 @@
             <p:ph type="title"/>
           </p:nvPr>
         </p:nvSpPr>
-        <p:spPr/>
+        <p:spPr>
+          <a:xfrm>
+            <a:off x="838200" y="365125"/>
+            <a:ext cx="10515600" cy="1325563"/>
+          </a:xfrm>
+          <a:prstGeom prst="rect">
+            <a:avLst/>
+          </a:prstGeom>
+        </p:spPr>
         <p:txBody>
           <a:bodyPr/>
           <a:lstStyle/>
@@ -1866,14 +2115,22 @@
             <p:ph type="dt" sz="half" idx="10"/>
           </p:nvPr>
         </p:nvSpPr>
-        <p:spPr/>
+        <p:spPr>
+          <a:xfrm>
+            <a:off x="838200" y="6356350"/>
+            <a:ext cx="2743200" cy="365125"/>
+          </a:xfrm>
+          <a:prstGeom prst="rect">
+            <a:avLst/>
+          </a:prstGeom>
+        </p:spPr>
         <p:txBody>
           <a:bodyPr/>
           <a:lstStyle/>
           <a:p>
             <a:fld id="{BF754244-AAAE-40DB-B4EC-80B888C903F9}" type="datetimeFigureOut">
               <a:rPr lang="en-IN" smtClean="0"/>
-              <a:t>30-12-2022</a:t>
+              <a:t>01-01-2023</a:t>
             </a:fld>
             <a:endParaRPr lang="en-IN"/>
           </a:p>
@@ -1895,7 +2152,15 @@
             <p:ph type="ftr" sz="quarter" idx="11"/>
           </p:nvPr>
         </p:nvSpPr>
-        <p:spPr/>
+        <p:spPr>
+          <a:xfrm>
+            <a:off x="4038600" y="6356350"/>
+            <a:ext cx="4114800" cy="365125"/>
+          </a:xfrm>
+          <a:prstGeom prst="rect">
+            <a:avLst/>
+          </a:prstGeom>
+        </p:spPr>
         <p:txBody>
           <a:bodyPr/>
           <a:lstStyle/>
@@ -1920,7 +2185,15 @@
             <p:ph type="sldNum" sz="quarter" idx="12"/>
           </p:nvPr>
         </p:nvSpPr>
-        <p:spPr/>
+        <p:spPr>
+          <a:xfrm>
+            <a:off x="8610600" y="6356350"/>
+            <a:ext cx="2743200" cy="365125"/>
+          </a:xfrm>
+          <a:prstGeom prst="rect">
+            <a:avLst/>
+          </a:prstGeom>
+        </p:spPr>
         <p:txBody>
           <a:bodyPr/>
           <a:lstStyle/>
@@ -1979,14 +2252,22 @@
             <p:ph type="dt" sz="half" idx="10"/>
           </p:nvPr>
         </p:nvSpPr>
-        <p:spPr/>
+        <p:spPr>
+          <a:xfrm>
+            <a:off x="838200" y="6356350"/>
+            <a:ext cx="2743200" cy="365125"/>
+          </a:xfrm>
+          <a:prstGeom prst="rect">
+            <a:avLst/>
+          </a:prstGeom>
+        </p:spPr>
         <p:txBody>
           <a:bodyPr/>
           <a:lstStyle/>
           <a:p>
             <a:fld id="{BF754244-AAAE-40DB-B4EC-80B888C903F9}" type="datetimeFigureOut">
               <a:rPr lang="en-IN" smtClean="0"/>
-              <a:t>30-12-2022</a:t>
+              <a:t>01-01-2023</a:t>
             </a:fld>
             <a:endParaRPr lang="en-IN"/>
           </a:p>
@@ -2008,7 +2289,15 @@
             <p:ph type="ftr" sz="quarter" idx="11"/>
           </p:nvPr>
         </p:nvSpPr>
-        <p:spPr/>
+        <p:spPr>
+          <a:xfrm>
+            <a:off x="4038600" y="6356350"/>
+            <a:ext cx="4114800" cy="365125"/>
+          </a:xfrm>
+          <a:prstGeom prst="rect">
+            <a:avLst/>
+          </a:prstGeom>
+        </p:spPr>
         <p:txBody>
           <a:bodyPr/>
           <a:lstStyle/>
@@ -2033,7 +2322,15 @@
             <p:ph type="sldNum" sz="quarter" idx="12"/>
           </p:nvPr>
         </p:nvSpPr>
-        <p:spPr/>
+        <p:spPr>
+          <a:xfrm>
+            <a:off x="8610600" y="6356350"/>
+            <a:ext cx="2743200" cy="365125"/>
+          </a:xfrm>
+          <a:prstGeom prst="rect">
+            <a:avLst/>
+          </a:prstGeom>
+        </p:spPr>
         <p:txBody>
           <a:bodyPr/>
           <a:lstStyle/>
@@ -2097,6 +2394,9 @@
             <a:off x="839788" y="457200"/>
             <a:ext cx="3932237" cy="1600200"/>
           </a:xfrm>
+          <a:prstGeom prst="rect">
+            <a:avLst/>
+          </a:prstGeom>
         </p:spPr>
         <p:txBody>
           <a:bodyPr anchor="b"/>
@@ -2135,6 +2435,9 @@
             <a:off x="5183188" y="987425"/>
             <a:ext cx="6172200" cy="4873625"/>
           </a:xfrm>
+          <a:prstGeom prst="rect">
+            <a:avLst/>
+          </a:prstGeom>
         </p:spPr>
         <p:txBody>
           <a:bodyPr/>
@@ -2226,6 +2529,9 @@
             <a:off x="839788" y="2057400"/>
             <a:ext cx="3932237" cy="3811588"/>
           </a:xfrm>
+          <a:prstGeom prst="rect">
+            <a:avLst/>
+          </a:prstGeom>
         </p:spPr>
         <p:txBody>
           <a:bodyPr/>
@@ -2292,14 +2598,22 @@
             <p:ph type="dt" sz="half" idx="10"/>
           </p:nvPr>
         </p:nvSpPr>
-        <p:spPr/>
+        <p:spPr>
+          <a:xfrm>
+            <a:off x="838200" y="6356350"/>
+            <a:ext cx="2743200" cy="365125"/>
+          </a:xfrm>
+          <a:prstGeom prst="rect">
+            <a:avLst/>
+          </a:prstGeom>
+        </p:spPr>
         <p:txBody>
           <a:bodyPr/>
           <a:lstStyle/>
           <a:p>
             <a:fld id="{BF754244-AAAE-40DB-B4EC-80B888C903F9}" type="datetimeFigureOut">
               <a:rPr lang="en-IN" smtClean="0"/>
-              <a:t>30-12-2022</a:t>
+              <a:t>01-01-2023</a:t>
             </a:fld>
             <a:endParaRPr lang="en-IN"/>
           </a:p>
@@ -2321,7 +2635,15 @@
             <p:ph type="ftr" sz="quarter" idx="11"/>
           </p:nvPr>
         </p:nvSpPr>
-        <p:spPr/>
+        <p:spPr>
+          <a:xfrm>
+            <a:off x="4038600" y="6356350"/>
+            <a:ext cx="4114800" cy="365125"/>
+          </a:xfrm>
+          <a:prstGeom prst="rect">
+            <a:avLst/>
+          </a:prstGeom>
+        </p:spPr>
         <p:txBody>
           <a:bodyPr/>
           <a:lstStyle/>
@@ -2346,7 +2668,15 @@
             <p:ph type="sldNum" sz="quarter" idx="12"/>
           </p:nvPr>
         </p:nvSpPr>
-        <p:spPr/>
+        <p:spPr>
+          <a:xfrm>
+            <a:off x="8610600" y="6356350"/>
+            <a:ext cx="2743200" cy="365125"/>
+          </a:xfrm>
+          <a:prstGeom prst="rect">
+            <a:avLst/>
+          </a:prstGeom>
+        </p:spPr>
         <p:txBody>
           <a:bodyPr/>
           <a:lstStyle/>
@@ -2410,6 +2740,9 @@
             <a:off x="839788" y="457200"/>
             <a:ext cx="3932237" cy="1600200"/>
           </a:xfrm>
+          <a:prstGeom prst="rect">
+            <a:avLst/>
+          </a:prstGeom>
         </p:spPr>
         <p:txBody>
           <a:bodyPr anchor="b"/>
@@ -2448,6 +2781,9 @@
             <a:off x="5183188" y="987425"/>
             <a:ext cx="6172200" cy="4873625"/>
           </a:xfrm>
+          <a:prstGeom prst="rect">
+            <a:avLst/>
+          </a:prstGeom>
         </p:spPr>
         <p:txBody>
           <a:bodyPr/>
@@ -2515,6 +2851,9 @@
             <a:off x="839788" y="2057400"/>
             <a:ext cx="3932237" cy="3811588"/>
           </a:xfrm>
+          <a:prstGeom prst="rect">
+            <a:avLst/>
+          </a:prstGeom>
         </p:spPr>
         <p:txBody>
           <a:bodyPr/>
@@ -2581,14 +2920,22 @@
             <p:ph type="dt" sz="half" idx="10"/>
           </p:nvPr>
         </p:nvSpPr>
-        <p:spPr/>
+        <p:spPr>
+          <a:xfrm>
+            <a:off x="838200" y="6356350"/>
+            <a:ext cx="2743200" cy="365125"/>
+          </a:xfrm>
+          <a:prstGeom prst="rect">
+            <a:avLst/>
+          </a:prstGeom>
+        </p:spPr>
         <p:txBody>
           <a:bodyPr/>
           <a:lstStyle/>
           <a:p>
             <a:fld id="{BF754244-AAAE-40DB-B4EC-80B888C903F9}" type="datetimeFigureOut">
               <a:rPr lang="en-IN" smtClean="0"/>
-              <a:t>30-12-2022</a:t>
+              <a:t>01-01-2023</a:t>
             </a:fld>
             <a:endParaRPr lang="en-IN"/>
           </a:p>
@@ -2610,7 +2957,15 @@
             <p:ph type="ftr" sz="quarter" idx="11"/>
           </p:nvPr>
         </p:nvSpPr>
-        <p:spPr/>
+        <p:spPr>
+          <a:xfrm>
+            <a:off x="4038600" y="6356350"/>
+            <a:ext cx="4114800" cy="365125"/>
+          </a:xfrm>
+          <a:prstGeom prst="rect">
+            <a:avLst/>
+          </a:prstGeom>
+        </p:spPr>
         <p:txBody>
           <a:bodyPr/>
           <a:lstStyle/>
@@ -2635,7 +2990,15 @@
             <p:ph type="sldNum" sz="quarter" idx="12"/>
           </p:nvPr>
         </p:nvSpPr>
-        <p:spPr/>
+        <p:spPr>
+          <a:xfrm>
+            <a:off x="8610600" y="6356350"/>
+            <a:ext cx="2743200" cy="365125"/>
+          </a:xfrm>
+          <a:prstGeom prst="rect">
+            <a:avLst/>
+          </a:prstGeom>
+        </p:spPr>
         <p:txBody>
           <a:bodyPr/>
           <a:lstStyle/>
@@ -2683,247 +3046,82 @@
           <a:chExt cx="0" cy="0"/>
         </a:xfrm>
       </p:grpSpPr>
-      <p:sp>
-        <p:nvSpPr>
-          <p:cNvPr id="2" name="Title Placeholder 1">
+      <p:pic>
+        <p:nvPicPr>
+          <p:cNvPr id="7" name="Picture 6" descr="Shape">
             <a:extLst>
               <a:ext uri="{FF2B5EF4-FFF2-40B4-BE49-F238E27FC236}">
-                <a16:creationId xmlns:a16="http://schemas.microsoft.com/office/drawing/2014/main" id="{9F7442AA-E3E0-ADBB-3326-A961200EC485}"/>
+                <a16:creationId xmlns:a16="http://schemas.microsoft.com/office/drawing/2014/main" id="{7923ECAA-E74A-E47F-E1BD-7914837E2519}"/>
               </a:ext>
             </a:extLst>
           </p:cNvPr>
-          <p:cNvSpPr>
-            <a:spLocks noGrp="1"/>
-          </p:cNvSpPr>
-          <p:nvPr>
-            <p:ph type="title"/>
-          </p:nvPr>
-        </p:nvSpPr>
+          <p:cNvPicPr>
+            <a:picLocks noChangeAspect="1"/>
+          </p:cNvPicPr>
+          <p:nvPr userDrawn="1"/>
+        </p:nvPicPr>
+        <p:blipFill>
+          <a:blip r:embed="rId13">
+            <a:extLst>
+              <a:ext uri="{28A0092B-C50C-407E-A947-70E740481C1C}">
+                <a14:useLocalDpi xmlns:a14="http://schemas.microsoft.com/office/drawing/2010/main" val="0"/>
+              </a:ext>
+            </a:extLst>
+          </a:blip>
+          <a:stretch>
+            <a:fillRect/>
+          </a:stretch>
+        </p:blipFill>
         <p:spPr>
           <a:xfrm>
-            <a:off x="838200" y="365125"/>
-            <a:ext cx="10515600" cy="1325563"/>
+            <a:off x="5913" y="0"/>
+            <a:ext cx="12180173" cy="6858000"/>
           </a:xfrm>
           <a:prstGeom prst="rect">
             <a:avLst/>
           </a:prstGeom>
         </p:spPr>
-        <p:txBody>
-          <a:bodyPr vert="horz" lIns="91440" tIns="45720" rIns="91440" bIns="45720" rtlCol="0" anchor="ctr">
-            <a:normAutofit/>
-          </a:bodyPr>
-          <a:lstStyle/>
-          <a:p>
-            <a:r>
-              <a:rPr lang="en-US"/>
-              <a:t>Click to edit Master title style</a:t>
-            </a:r>
-            <a:endParaRPr lang="en-IN"/>
-          </a:p>
-        </p:txBody>
-      </p:sp>
+      </p:pic>
       <p:sp>
         <p:nvSpPr>
-          <p:cNvPr id="3" name="Text Placeholder 2">
+          <p:cNvPr id="8" name="TextBox 7">
             <a:extLst>
               <a:ext uri="{FF2B5EF4-FFF2-40B4-BE49-F238E27FC236}">
-                <a16:creationId xmlns:a16="http://schemas.microsoft.com/office/drawing/2014/main" id="{DF76053C-44D1-61AC-C2EF-EB1762A5FB61}"/>
+                <a16:creationId xmlns:a16="http://schemas.microsoft.com/office/drawing/2014/main" id="{A5FC093B-F788-845C-4819-8ACD799D9785}"/>
               </a:ext>
             </a:extLst>
           </p:cNvPr>
-          <p:cNvSpPr>
-            <a:spLocks noGrp="1"/>
-          </p:cNvSpPr>
-          <p:nvPr>
-            <p:ph type="body" idx="1"/>
-          </p:nvPr>
+          <p:cNvSpPr txBox="1"/>
+          <p:nvPr userDrawn="1"/>
         </p:nvSpPr>
         <p:spPr>
           <a:xfrm>
-            <a:off x="838200" y="1825625"/>
-            <a:ext cx="10515600" cy="4351338"/>
+            <a:off x="0" y="6488668"/>
+            <a:ext cx="2980303" cy="276999"/>
           </a:xfrm>
           <a:prstGeom prst="rect">
             <a:avLst/>
           </a:prstGeom>
+          <a:noFill/>
         </p:spPr>
         <p:txBody>
-          <a:bodyPr vert="horz" lIns="91440" tIns="45720" rIns="91440" bIns="45720" rtlCol="0">
-            <a:normAutofit/>
+          <a:bodyPr wrap="none" rtlCol="0">
+            <a:spAutoFit/>
           </a:bodyPr>
           <a:lstStyle/>
           <a:p>
-            <a:pPr lvl="0"/>
-            <a:r>
-              <a:rPr lang="en-US"/>
-              <a:t>Click to edit Master text styles</a:t>
-            </a:r>
-          </a:p>
-          <a:p>
-            <a:pPr lvl="1"/>
-            <a:r>
-              <a:rPr lang="en-US"/>
-              <a:t>Second level</a:t>
-            </a:r>
-          </a:p>
-          <a:p>
-            <a:pPr lvl="2"/>
-            <a:r>
-              <a:rPr lang="en-US"/>
-              <a:t>Third level</a:t>
-            </a:r>
-          </a:p>
-          <a:p>
-            <a:pPr lvl="3"/>
-            <a:r>
-              <a:rPr lang="en-US"/>
-              <a:t>Fourth level</a:t>
-            </a:r>
-          </a:p>
-          <a:p>
-            <a:pPr lvl="4"/>
-            <a:r>
-              <a:rPr lang="en-US"/>
-              <a:t>Fifth level</a:t>
-            </a:r>
-            <a:endParaRPr lang="en-IN"/>
-          </a:p>
-        </p:txBody>
-      </p:sp>
-      <p:sp>
-        <p:nvSpPr>
-          <p:cNvPr id="4" name="Date Placeholder 3">
-            <a:extLst>
-              <a:ext uri="{FF2B5EF4-FFF2-40B4-BE49-F238E27FC236}">
-                <a16:creationId xmlns:a16="http://schemas.microsoft.com/office/drawing/2014/main" id="{D33322C1-8B15-3469-07FE-897325000514}"/>
-              </a:ext>
-            </a:extLst>
-          </p:cNvPr>
-          <p:cNvSpPr>
-            <a:spLocks noGrp="1"/>
-          </p:cNvSpPr>
-          <p:nvPr>
-            <p:ph type="dt" sz="half" idx="2"/>
-          </p:nvPr>
-        </p:nvSpPr>
-        <p:spPr>
-          <a:xfrm>
-            <a:off x="838200" y="6356350"/>
-            <a:ext cx="2743200" cy="365125"/>
-          </a:xfrm>
-          <a:prstGeom prst="rect">
-            <a:avLst/>
-          </a:prstGeom>
-        </p:spPr>
-        <p:txBody>
-          <a:bodyPr vert="horz" lIns="91440" tIns="45720" rIns="91440" bIns="45720" rtlCol="0" anchor="ctr"/>
-          <a:lstStyle>
-            <a:lvl1pPr algn="l">
-              <a:defRPr sz="1200">
+            <a:r>
+              <a:rPr lang="en-IN" sz="1200" dirty="0">
                 <a:solidFill>
-                  <a:schemeClr val="tx1">
-                    <a:tint val="75000"/>
+                  <a:schemeClr val="accent1">
+                    <a:lumMod val="20000"/>
+                    <a:lumOff val="80000"/>
                   </a:schemeClr>
                 </a:solidFill>
-              </a:defRPr>
-            </a:lvl1pPr>
-          </a:lstStyle>
-          <a:p>
-            <a:fld id="{BF754244-AAAE-40DB-B4EC-80B888C903F9}" type="datetimeFigureOut">
-              <a:rPr lang="en-IN" smtClean="0"/>
-              <a:t>30-12-2022</a:t>
-            </a:fld>
-            <a:endParaRPr lang="en-IN"/>
-          </a:p>
-        </p:txBody>
-      </p:sp>
-      <p:sp>
-        <p:nvSpPr>
-          <p:cNvPr id="5" name="Footer Placeholder 4">
-            <a:extLst>
-              <a:ext uri="{FF2B5EF4-FFF2-40B4-BE49-F238E27FC236}">
-                <a16:creationId xmlns:a16="http://schemas.microsoft.com/office/drawing/2014/main" id="{9C7D7968-7897-316E-2B42-F196EAB73C34}"/>
-              </a:ext>
-            </a:extLst>
-          </p:cNvPr>
-          <p:cNvSpPr>
-            <a:spLocks noGrp="1"/>
-          </p:cNvSpPr>
-          <p:nvPr>
-            <p:ph type="ftr" sz="quarter" idx="3"/>
-          </p:nvPr>
-        </p:nvSpPr>
-        <p:spPr>
-          <a:xfrm>
-            <a:off x="4038600" y="6356350"/>
-            <a:ext cx="4114800" cy="365125"/>
-          </a:xfrm>
-          <a:prstGeom prst="rect">
-            <a:avLst/>
-          </a:prstGeom>
-        </p:spPr>
-        <p:txBody>
-          <a:bodyPr vert="horz" lIns="91440" tIns="45720" rIns="91440" bIns="45720" rtlCol="0" anchor="ctr"/>
-          <a:lstStyle>
-            <a:lvl1pPr algn="ctr">
-              <a:defRPr sz="1200">
-                <a:solidFill>
-                  <a:schemeClr val="tx1">
-                    <a:tint val="75000"/>
-                  </a:schemeClr>
-                </a:solidFill>
-              </a:defRPr>
-            </a:lvl1pPr>
-          </a:lstStyle>
-          <a:p>
-            <a:endParaRPr lang="en-IN"/>
-          </a:p>
-        </p:txBody>
-      </p:sp>
-      <p:sp>
-        <p:nvSpPr>
-          <p:cNvPr id="6" name="Slide Number Placeholder 5">
-            <a:extLst>
-              <a:ext uri="{FF2B5EF4-FFF2-40B4-BE49-F238E27FC236}">
-                <a16:creationId xmlns:a16="http://schemas.microsoft.com/office/drawing/2014/main" id="{568445F8-78FC-F814-D817-A08F90771A9A}"/>
-              </a:ext>
-            </a:extLst>
-          </p:cNvPr>
-          <p:cNvSpPr>
-            <a:spLocks noGrp="1"/>
-          </p:cNvSpPr>
-          <p:nvPr>
-            <p:ph type="sldNum" sz="quarter" idx="4"/>
-          </p:nvPr>
-        </p:nvSpPr>
-        <p:spPr>
-          <a:xfrm>
-            <a:off x="8610600" y="6356350"/>
-            <a:ext cx="2743200" cy="365125"/>
-          </a:xfrm>
-          <a:prstGeom prst="rect">
-            <a:avLst/>
-          </a:prstGeom>
-        </p:spPr>
-        <p:txBody>
-          <a:bodyPr vert="horz" lIns="91440" tIns="45720" rIns="91440" bIns="45720" rtlCol="0" anchor="ctr"/>
-          <a:lstStyle>
-            <a:lvl1pPr algn="r">
-              <a:defRPr sz="1200">
-                <a:solidFill>
-                  <a:schemeClr val="tx1">
-                    <a:tint val="75000"/>
-                  </a:schemeClr>
-                </a:solidFill>
-              </a:defRPr>
-            </a:lvl1pPr>
-          </a:lstStyle>
-          <a:p>
-            <a:fld id="{EED508B0-4196-46CB-9AD8-8A2AAF9364CA}" type="slidenum">
-              <a:rPr lang="en-IN" smtClean="0"/>
-              <a:t>‹#›</a:t>
-            </a:fld>
-            <a:endParaRPr lang="en-IN"/>
+                <a:latin typeface="Adobe Clean UX SemiLight" panose="020B0403020404020204" pitchFamily="34" charset="0"/>
+              </a:rPr>
+              <a:t>OpenSTAAD for Productive Structural Designs</a:t>
+            </a:r>
           </a:p>
         </p:txBody>
       </p:sp>
@@ -4618,7 +4816,7 @@
         </p:nvSpPr>
         <p:spPr>
           <a:xfrm>
-            <a:off x="1048491" y="1682903"/>
+            <a:off x="2489102" y="2321838"/>
             <a:ext cx="7823200" cy="2214324"/>
           </a:xfrm>
           <a:prstGeom prst="rect">
@@ -6461,42 +6659,6 @@
           <a:chExt cx="0" cy="0"/>
         </a:xfrm>
       </p:grpSpPr>
-      <p:pic>
-        <p:nvPicPr>
-          <p:cNvPr id="9" name="Picture 8" descr="Shape&#10;&#10;Description automatically generated">
-            <a:extLst>
-              <a:ext uri="{FF2B5EF4-FFF2-40B4-BE49-F238E27FC236}">
-                <a16:creationId xmlns:a16="http://schemas.microsoft.com/office/drawing/2014/main" id="{02D3B69F-76AE-5FC8-ECDF-6721877F9738}"/>
-              </a:ext>
-            </a:extLst>
-          </p:cNvPr>
-          <p:cNvPicPr>
-            <a:picLocks noChangeAspect="1"/>
-          </p:cNvPicPr>
-          <p:nvPr/>
-        </p:nvPicPr>
-        <p:blipFill>
-          <a:blip r:embed="rId2">
-            <a:extLst>
-              <a:ext uri="{28A0092B-C50C-407E-A947-70E740481C1C}">
-                <a14:useLocalDpi xmlns:a14="http://schemas.microsoft.com/office/drawing/2010/main" val="0"/>
-              </a:ext>
-            </a:extLst>
-          </a:blip>
-          <a:stretch>
-            <a:fillRect/>
-          </a:stretch>
-        </p:blipFill>
-        <p:spPr>
-          <a:xfrm>
-            <a:off x="5913" y="0"/>
-            <a:ext cx="12180173" cy="6858000"/>
-          </a:xfrm>
-          <a:prstGeom prst="rect">
-            <a:avLst/>
-          </a:prstGeom>
-        </p:spPr>
-      </p:pic>
     </p:spTree>
     <p:extLst>
       <p:ext uri="{BB962C8B-B14F-4D97-AF65-F5344CB8AC3E}">

</xml_diff>